<commit_message>
Added one more task for homework for day 1
</commit_message>
<xml_diff>
--- a/day1/Elixir - Day 1.pptx
+++ b/day1/Elixir - Day 1.pptx
@@ -42,7 +42,7 @@
     <p:sldId id="320" r:id="rId37"/>
     <p:sldId id="321" r:id="rId38"/>
     <p:sldId id="291" r:id="rId39"/>
-    <p:sldId id="287" r:id="rId40"/>
+    <p:sldId id="332" r:id="rId40"/>
     <p:sldId id="299" r:id="rId41"/>
   </p:sldIdLst>
   <p:sldSz cx="12192000" cy="6858000"/>
@@ -985,7 +985,7 @@
           </a:ln>
           <a:extLst>
             <a:ext uri="{C572A759-6A51-4108-AA02-DFA0A04FC94B}">
-              <ma14:wrappingTextBoxFlag xmlns="" xmlns:ma14="http://schemas.microsoft.com/office/mac/drawingml/2011/main" xmlns:a14="http://schemas.microsoft.com/office/drawing/2010/main" xmlns:m="http://schemas.openxmlformats.org/officeDocument/2006/math" val="1"/>
+              <ma14:wrappingTextBoxFlag xmlns:m="http://schemas.openxmlformats.org/officeDocument/2006/math" xmlns:a14="http://schemas.microsoft.com/office/drawing/2010/main" xmlns:ma14="http://schemas.microsoft.com/office/mac/drawingml/2011/main" xmlns="" val="1"/>
             </a:ext>
           </a:extLst>
         </p:spPr>
@@ -1260,7 +1260,7 @@
           </a:ln>
           <a:extLst>
             <a:ext uri="{C572A759-6A51-4108-AA02-DFA0A04FC94B}">
-              <ma14:wrappingTextBoxFlag xmlns="" xmlns:ma14="http://schemas.microsoft.com/office/mac/drawingml/2011/main" xmlns:a14="http://schemas.microsoft.com/office/drawing/2010/main" xmlns:m="http://schemas.openxmlformats.org/officeDocument/2006/math" val="1"/>
+              <ma14:wrappingTextBoxFlag xmlns:m="http://schemas.openxmlformats.org/officeDocument/2006/math" xmlns:a14="http://schemas.microsoft.com/office/drawing/2010/main" xmlns:ma14="http://schemas.microsoft.com/office/mac/drawingml/2011/main" xmlns="" val="1"/>
             </a:ext>
           </a:extLst>
         </p:spPr>
@@ -1699,7 +1699,7 @@
           </a:ln>
           <a:extLst>
             <a:ext uri="{C572A759-6A51-4108-AA02-DFA0A04FC94B}">
-              <ma14:wrappingTextBoxFlag xmlns="" xmlns:ma14="http://schemas.microsoft.com/office/mac/drawingml/2011/main" xmlns:a14="http://schemas.microsoft.com/office/drawing/2010/main" xmlns:m="http://schemas.openxmlformats.org/officeDocument/2006/math" val="1"/>
+              <ma14:wrappingTextBoxFlag xmlns:m="http://schemas.openxmlformats.org/officeDocument/2006/math" xmlns:a14="http://schemas.microsoft.com/office/drawing/2010/main" xmlns:ma14="http://schemas.microsoft.com/office/mac/drawingml/2011/main" xmlns="" val="1"/>
             </a:ext>
           </a:extLst>
         </p:spPr>
@@ -1919,7 +1919,7 @@
           </a:ln>
           <a:extLst>
             <a:ext uri="{C572A759-6A51-4108-AA02-DFA0A04FC94B}">
-              <ma14:wrappingTextBoxFlag xmlns="" xmlns:ma14="http://schemas.microsoft.com/office/mac/drawingml/2011/main" xmlns:a14="http://schemas.microsoft.com/office/drawing/2010/main" xmlns:m="http://schemas.openxmlformats.org/officeDocument/2006/math" val="1"/>
+              <ma14:wrappingTextBoxFlag xmlns:m="http://schemas.openxmlformats.org/officeDocument/2006/math" xmlns:a14="http://schemas.microsoft.com/office/drawing/2010/main" xmlns:ma14="http://schemas.microsoft.com/office/mac/drawingml/2011/main" xmlns="" val="1"/>
             </a:ext>
           </a:extLst>
         </p:spPr>
@@ -2120,7 +2120,7 @@
           </a:ln>
           <a:extLst>
             <a:ext uri="{C572A759-6A51-4108-AA02-DFA0A04FC94B}">
-              <ma14:wrappingTextBoxFlag xmlns="" xmlns:ma14="http://schemas.microsoft.com/office/mac/drawingml/2011/main" xmlns:a14="http://schemas.microsoft.com/office/drawing/2010/main" xmlns:m="http://schemas.openxmlformats.org/officeDocument/2006/math" val="1"/>
+              <ma14:wrappingTextBoxFlag xmlns:m="http://schemas.openxmlformats.org/officeDocument/2006/math" xmlns:a14="http://schemas.microsoft.com/office/drawing/2010/main" xmlns:ma14="http://schemas.microsoft.com/office/mac/drawingml/2011/main" xmlns="" val="1"/>
             </a:ext>
           </a:extLst>
         </p:spPr>
@@ -2219,7 +2219,7 @@
           </a:ln>
           <a:extLst>
             <a:ext uri="{C572A759-6A51-4108-AA02-DFA0A04FC94B}">
-              <ma14:wrappingTextBoxFlag xmlns="" xmlns:ma14="http://schemas.microsoft.com/office/mac/drawingml/2011/main" xmlns:a14="http://schemas.microsoft.com/office/drawing/2010/main" xmlns:m="http://schemas.openxmlformats.org/officeDocument/2006/math" val="1"/>
+              <ma14:wrappingTextBoxFlag xmlns:m="http://schemas.openxmlformats.org/officeDocument/2006/math" xmlns:a14="http://schemas.microsoft.com/office/drawing/2010/main" xmlns:ma14="http://schemas.microsoft.com/office/mac/drawingml/2011/main" xmlns="" val="1"/>
             </a:ext>
           </a:extLst>
         </p:spPr>
@@ -2258,7 +2258,7 @@
           </a:ln>
           <a:extLst>
             <a:ext uri="{C572A759-6A51-4108-AA02-DFA0A04FC94B}">
-              <ma14:wrappingTextBoxFlag xmlns="" xmlns:ma14="http://schemas.microsoft.com/office/mac/drawingml/2011/main" xmlns:a14="http://schemas.microsoft.com/office/drawing/2010/main" xmlns:m="http://schemas.openxmlformats.org/officeDocument/2006/math" val="1"/>
+              <ma14:wrappingTextBoxFlag xmlns:m="http://schemas.openxmlformats.org/officeDocument/2006/math" xmlns:a14="http://schemas.microsoft.com/office/drawing/2010/main" xmlns:ma14="http://schemas.microsoft.com/office/mac/drawingml/2011/main" xmlns="" val="1"/>
             </a:ext>
           </a:extLst>
         </p:spPr>
@@ -2418,7 +2418,7 @@
           </a:ln>
           <a:extLst>
             <a:ext uri="{C572A759-6A51-4108-AA02-DFA0A04FC94B}">
-              <ma14:wrappingTextBoxFlag xmlns="" xmlns:ma14="http://schemas.microsoft.com/office/mac/drawingml/2011/main" xmlns:a14="http://schemas.microsoft.com/office/drawing/2010/main" xmlns:m="http://schemas.openxmlformats.org/officeDocument/2006/math" val="1"/>
+              <ma14:wrappingTextBoxFlag xmlns:m="http://schemas.openxmlformats.org/officeDocument/2006/math" xmlns:a14="http://schemas.microsoft.com/office/drawing/2010/main" xmlns:ma14="http://schemas.microsoft.com/office/mac/drawingml/2011/main" xmlns="" val="1"/>
             </a:ext>
           </a:extLst>
         </p:spPr>
@@ -21294,10 +21294,10 @@
       </p:grpSpPr>
       <p:sp>
         <p:nvSpPr>
-          <p:cNvPr id="2" name="Title 1">
+          <p:cNvPr id="4" name="Title 3">
             <a:extLst>
               <a:ext uri="{FF2B5EF4-FFF2-40B4-BE49-F238E27FC236}">
-                <a16:creationId xmlns:a16="http://schemas.microsoft.com/office/drawing/2014/main" id="{79EE08F3-5D90-4DF6-96DA-31714BCF32BF}"/>
+                <a16:creationId xmlns:a16="http://schemas.microsoft.com/office/drawing/2014/main" id="{14CB4D1E-4C6A-1383-A14F-192220A1AF62}"/>
               </a:ext>
             </a:extLst>
           </p:cNvPr>
@@ -21315,17 +21315,18 @@
           <a:p>
             <a:r>
               <a:rPr lang="en-US" dirty="0"/>
-              <a:t>Q &amp; A</a:t>
-            </a:r>
+              <a:t>Homework</a:t>
+            </a:r>
+            <a:endParaRPr lang="bg-BG" dirty="0"/>
           </a:p>
         </p:txBody>
       </p:sp>
       <p:sp>
         <p:nvSpPr>
-          <p:cNvPr id="3" name="Text Placeholder 2">
+          <p:cNvPr id="5" name="Text Placeholder 4">
             <a:extLst>
               <a:ext uri="{FF2B5EF4-FFF2-40B4-BE49-F238E27FC236}">
-                <a16:creationId xmlns:a16="http://schemas.microsoft.com/office/drawing/2014/main" id="{1D1EDDDB-BF45-4C61-823B-9FB45ED6F51F}"/>
+                <a16:creationId xmlns:a16="http://schemas.microsoft.com/office/drawing/2014/main" id="{0B865E72-557E-33D1-C34E-79235E331D6E}"/>
               </a:ext>
             </a:extLst>
           </p:cNvPr>
@@ -21333,7 +21334,7 @@
             <a:spLocks noGrp="1"/>
           </p:cNvSpPr>
           <p:nvPr>
-            <p:ph type="body" sz="half" idx="1"/>
+            <p:ph type="body" idx="1"/>
           </p:nvPr>
         </p:nvSpPr>
         <p:spPr/>
@@ -21341,14 +21342,49 @@
           <a:bodyPr/>
           <a:lstStyle/>
           <a:p>
-            <a:endParaRPr lang="en-US"/>
+            <a:r>
+              <a:rPr lang="en-US" dirty="0">
+                <a:hlinkClick r:id="rId2"/>
+              </a:rPr>
+              <a:t>https://github.com/georgiyolovski/elixir-workshop/tree/main/day1/homework</a:t>
+            </a:r>
+            <a:endParaRPr lang="en-US" dirty="0"/>
+          </a:p>
+          <a:p>
+            <a:endParaRPr lang="en-US" dirty="0"/>
+          </a:p>
+          <a:p>
+            <a:r>
+              <a:rPr lang="en-US" dirty="0"/>
+              <a:t>The following module references might be helpful:</a:t>
+            </a:r>
+          </a:p>
+          <a:p>
+            <a:pPr lvl="1"/>
+            <a:r>
+              <a:rPr lang="en-US" dirty="0">
+                <a:hlinkClick r:id="rId3"/>
+              </a:rPr>
+              <a:t>https://hexdocs.pm/elixir/Enum.html</a:t>
+            </a:r>
+            <a:endParaRPr lang="en-US" dirty="0"/>
+          </a:p>
+          <a:p>
+            <a:pPr lvl="1"/>
+            <a:r>
+              <a:rPr lang="en-US" dirty="0">
+                <a:hlinkClick r:id="rId4"/>
+              </a:rPr>
+              <a:t>https://hexdocs.pm/elixir/Map.html</a:t>
+            </a:r>
+            <a:endParaRPr lang="bg-BG" dirty="0"/>
           </a:p>
         </p:txBody>
       </p:sp>
     </p:spTree>
     <p:extLst>
       <p:ext uri="{BB962C8B-B14F-4D97-AF65-F5344CB8AC3E}">
-        <p14:creationId xmlns:p14="http://schemas.microsoft.com/office/powerpoint/2010/main" val="2873828072"/>
+        <p14:creationId xmlns:p14="http://schemas.microsoft.com/office/powerpoint/2010/main" val="1742023883"/>
       </p:ext>
     </p:extLst>
   </p:cSld>
@@ -25986,6 +26022,15 @@
 </file>
 
 <file path=customXml/item1.xml><?xml version="1.0" encoding="utf-8"?>
+<?mso-contentType ?>
+<FormTemplates xmlns="http://schemas.microsoft.com/sharepoint/v3/contenttype/forms">
+  <Display>DocumentLibraryForm</Display>
+  <Edit>DocumentLibraryForm</Edit>
+  <New>DocumentLibraryForm</New>
+</FormTemplates>
+</file>
+
+<file path=customXml/item2.xml><?xml version="1.0" encoding="utf-8"?>
 <p:properties xmlns:p="http://schemas.microsoft.com/office/2006/metadata/properties" xmlns:xsi="http://www.w3.org/2001/XMLSchema-instance" xmlns:pc="http://schemas.microsoft.com/office/infopath/2007/PartnerControls">
   <documentManagement>
     <_dlc_DocId xmlns="ee5a019c-1afb-4a7f-aa3c-a300d54b8a94">4ZA6FPYH4N22-134279970-49061</_dlc_DocId>
@@ -26001,16 +26046,57 @@
 </p:properties>
 </file>
 
-<file path=customXml/item2.xml><?xml version="1.0" encoding="utf-8"?>
+<file path=customXml/item3.xml><?xml version="1.0" encoding="utf-8"?>
 <?mso-contentType ?>
-<FormTemplates xmlns="http://schemas.microsoft.com/sharepoint/v3/contenttype/forms">
-  <Display>DocumentLibraryForm</Display>
-  <Edit>DocumentLibraryForm</Edit>
-  <New>DocumentLibraryForm</New>
-</FormTemplates>
+<spe:Receivers xmlns:spe="http://schemas.microsoft.com/sharepoint/events">
+  <Receiver>
+    <Name>Document ID Generator</Name>
+    <Synchronization>Synchronous</Synchronization>
+    <Type>10001</Type>
+    <SequenceNumber>1000</SequenceNumber>
+    <Url/>
+    <Assembly>Microsoft.Office.DocumentManagement, Version=16.0.0.0, Culture=neutral, PublicKeyToken=71e9bce111e9429c</Assembly>
+    <Class>Microsoft.Office.DocumentManagement.Internal.DocIdHandler</Class>
+    <Data/>
+    <Filter/>
+  </Receiver>
+  <Receiver>
+    <Name>Document ID Generator</Name>
+    <Synchronization>Synchronous</Synchronization>
+    <Type>10002</Type>
+    <SequenceNumber>1001</SequenceNumber>
+    <Url/>
+    <Assembly>Microsoft.Office.DocumentManagement, Version=16.0.0.0, Culture=neutral, PublicKeyToken=71e9bce111e9429c</Assembly>
+    <Class>Microsoft.Office.DocumentManagement.Internal.DocIdHandler</Class>
+    <Data/>
+    <Filter/>
+  </Receiver>
+  <Receiver>
+    <Name>Document ID Generator</Name>
+    <Synchronization>Synchronous</Synchronization>
+    <Type>10004</Type>
+    <SequenceNumber>1002</SequenceNumber>
+    <Url/>
+    <Assembly>Microsoft.Office.DocumentManagement, Version=16.0.0.0, Culture=neutral, PublicKeyToken=71e9bce111e9429c</Assembly>
+    <Class>Microsoft.Office.DocumentManagement.Internal.DocIdHandler</Class>
+    <Data/>
+    <Filter/>
+  </Receiver>
+  <Receiver>
+    <Name>Document ID Generator</Name>
+    <Synchronization>Synchronous</Synchronization>
+    <Type>10006</Type>
+    <SequenceNumber>1003</SequenceNumber>
+    <Url/>
+    <Assembly>Microsoft.Office.DocumentManagement, Version=16.0.0.0, Culture=neutral, PublicKeyToken=71e9bce111e9429c</Assembly>
+    <Class>Microsoft.Office.DocumentManagement.Internal.DocIdHandler</Class>
+    <Data/>
+    <Filter/>
+  </Receiver>
+</spe:Receivers>
 </file>
 
-<file path=customXml/item3.xml><?xml version="1.0" encoding="utf-8"?>
+<file path=customXml/item4.xml><?xml version="1.0" encoding="utf-8"?>
 <ct:contentTypeSchema xmlns:ct="http://schemas.microsoft.com/office/2006/metadata/contentType" xmlns:ma="http://schemas.microsoft.com/office/2006/metadata/properties/metaAttributes" ct:_="" ma:_="" ma:contentTypeName="Document" ma:contentTypeID="0x0101003F118A156F01C84E8E5E451D60C9243C" ma:contentTypeVersion="18" ma:contentTypeDescription="Create a new document." ma:contentTypeScope="" ma:versionID="81bba4710e6ed34fea4bd7f33693d27f">
   <xsd:schema xmlns:xsd="http://www.w3.org/2001/XMLSchema" xmlns:xs="http://www.w3.org/2001/XMLSchema" xmlns:p="http://schemas.microsoft.com/office/2006/metadata/properties" xmlns:ns2="ee5a019c-1afb-4a7f-aa3c-a300d54b8a94" xmlns:ns3="3d51c85a-c808-4fa3-a7c4-399d30d41b71" xmlns:ns4="cabbaafa-9d61-4c96-bf36-3d40c487f168" targetNamespace="http://schemas.microsoft.com/office/2006/metadata/properties" ma:root="true" ma:fieldsID="ea50bd8bc227bb2cc5fe2d0a23ee5167" ns2:_="" ns3:_="" ns4:_="">
     <xsd:import namespace="ee5a019c-1afb-4a7f-aa3c-a300d54b8a94"/>
@@ -26283,57 +26369,15 @@
 </ct:contentTypeSchema>
 </file>
 
-<file path=customXml/item4.xml><?xml version="1.0" encoding="utf-8"?>
-<?mso-contentType ?>
-<spe:Receivers xmlns:spe="http://schemas.microsoft.com/sharepoint/events">
-  <Receiver>
-    <Name>Document ID Generator</Name>
-    <Synchronization>Synchronous</Synchronization>
-    <Type>10001</Type>
-    <SequenceNumber>1000</SequenceNumber>
-    <Url/>
-    <Assembly>Microsoft.Office.DocumentManagement, Version=16.0.0.0, Culture=neutral, PublicKeyToken=71e9bce111e9429c</Assembly>
-    <Class>Microsoft.Office.DocumentManagement.Internal.DocIdHandler</Class>
-    <Data/>
-    <Filter/>
-  </Receiver>
-  <Receiver>
-    <Name>Document ID Generator</Name>
-    <Synchronization>Synchronous</Synchronization>
-    <Type>10002</Type>
-    <SequenceNumber>1001</SequenceNumber>
-    <Url/>
-    <Assembly>Microsoft.Office.DocumentManagement, Version=16.0.0.0, Culture=neutral, PublicKeyToken=71e9bce111e9429c</Assembly>
-    <Class>Microsoft.Office.DocumentManagement.Internal.DocIdHandler</Class>
-    <Data/>
-    <Filter/>
-  </Receiver>
-  <Receiver>
-    <Name>Document ID Generator</Name>
-    <Synchronization>Synchronous</Synchronization>
-    <Type>10004</Type>
-    <SequenceNumber>1002</SequenceNumber>
-    <Url/>
-    <Assembly>Microsoft.Office.DocumentManagement, Version=16.0.0.0, Culture=neutral, PublicKeyToken=71e9bce111e9429c</Assembly>
-    <Class>Microsoft.Office.DocumentManagement.Internal.DocIdHandler</Class>
-    <Data/>
-    <Filter/>
-  </Receiver>
-  <Receiver>
-    <Name>Document ID Generator</Name>
-    <Synchronization>Synchronous</Synchronization>
-    <Type>10006</Type>
-    <SequenceNumber>1003</SequenceNumber>
-    <Url/>
-    <Assembly>Microsoft.Office.DocumentManagement, Version=16.0.0.0, Culture=neutral, PublicKeyToken=71e9bce111e9429c</Assembly>
-    <Class>Microsoft.Office.DocumentManagement.Internal.DocIdHandler</Class>
-    <Data/>
-    <Filter/>
-  </Receiver>
-</spe:Receivers>
+<file path=customXml/itemProps1.xml><?xml version="1.0" encoding="utf-8"?>
+<ds:datastoreItem xmlns:ds="http://schemas.openxmlformats.org/officeDocument/2006/customXml" ds:itemID="{450D9D61-AB1C-42DB-97B3-F16948BBEDA5}">
+  <ds:schemaRefs>
+    <ds:schemaRef ds:uri="http://schemas.microsoft.com/sharepoint/v3/contenttype/forms"/>
+  </ds:schemaRefs>
+</ds:datastoreItem>
 </file>
 
-<file path=customXml/itemProps1.xml><?xml version="1.0" encoding="utf-8"?>
+<file path=customXml/itemProps2.xml><?xml version="1.0" encoding="utf-8"?>
 <ds:datastoreItem xmlns:ds="http://schemas.openxmlformats.org/officeDocument/2006/customXml" ds:itemID="{28013F97-F744-428B-8504-911AB7D87FBC}">
   <ds:schemaRefs>
     <ds:schemaRef ds:uri="ee5a019c-1afb-4a7f-aa3c-a300d54b8a94"/>
@@ -26344,15 +26388,15 @@
 </ds:datastoreItem>
 </file>
 
-<file path=customXml/itemProps2.xml><?xml version="1.0" encoding="utf-8"?>
-<ds:datastoreItem xmlns:ds="http://schemas.openxmlformats.org/officeDocument/2006/customXml" ds:itemID="{450D9D61-AB1C-42DB-97B3-F16948BBEDA5}">
+<file path=customXml/itemProps3.xml><?xml version="1.0" encoding="utf-8"?>
+<ds:datastoreItem xmlns:ds="http://schemas.openxmlformats.org/officeDocument/2006/customXml" ds:itemID="{23731FFE-AA89-41C8-A8D1-96335015AC7D}">
   <ds:schemaRefs>
-    <ds:schemaRef ds:uri="http://schemas.microsoft.com/sharepoint/v3/contenttype/forms"/>
+    <ds:schemaRef ds:uri="http://schemas.microsoft.com/sharepoint/events"/>
   </ds:schemaRefs>
 </ds:datastoreItem>
 </file>
 
-<file path=customXml/itemProps3.xml><?xml version="1.0" encoding="utf-8"?>
+<file path=customXml/itemProps4.xml><?xml version="1.0" encoding="utf-8"?>
 <ds:datastoreItem xmlns:ds="http://schemas.openxmlformats.org/officeDocument/2006/customXml" ds:itemID="{D75CE82B-2AB8-470D-8DBA-A4AFD7F9BDEE}">
   <ds:schemaRefs>
     <ds:schemaRef ds:uri="http://schemas.microsoft.com/office/2006/metadata/contentType"/>
@@ -26370,12 +26414,4 @@
     <ds:schemaRef ds:uri="http://schemas.microsoft.com/internal/obd"/>
   </ds:schemaRefs>
 </ds:datastoreItem>
-</file>
-
-<file path=customXml/itemProps4.xml><?xml version="1.0" encoding="utf-8"?>
-<ds:datastoreItem xmlns:ds="http://schemas.openxmlformats.org/officeDocument/2006/customXml" ds:itemID="{23731FFE-AA89-41C8-A8D1-96335015AC7D}">
-  <ds:schemaRefs>
-    <ds:schemaRef ds:uri="http://schemas.microsoft.com/sharepoint/events"/>
-  </ds:schemaRefs>
-</ds:datastoreItem>
 </file>
</xml_diff>